<commit_message>
More progress on the Tokenization part.
</commit_message>
<xml_diff>
--- a/W8/W8S1/W8S1.pptx
+++ b/W8/W8S1/W8S1.pptx
@@ -303,7 +303,7 @@
   <pc:docChgLst>
     <pc:chgData name="Matthieu De Mari" userId="dfb708c9-d8dc-439f-9a3b-c772bf4a311c" providerId="ADAL" clId="{5AF9E225-0E3D-4808-B523-40F6E9A1D59D}"/>
     <pc:docChg chg="undo custSel mod addSld delSld modSld sldOrd modMainMaster addSection modSection">
-      <pc:chgData name="Matthieu De Mari" userId="dfb708c9-d8dc-439f-9a3b-c772bf4a311c" providerId="ADAL" clId="{5AF9E225-0E3D-4808-B523-40F6E9A1D59D}" dt="2023-03-14T09:08:16.163" v="4977" actId="113"/>
+      <pc:chgData name="Matthieu De Mari" userId="dfb708c9-d8dc-439f-9a3b-c772bf4a311c" providerId="ADAL" clId="{5AF9E225-0E3D-4808-B523-40F6E9A1D59D}" dt="2023-03-20T08:28:30.862" v="4980" actId="113"/>
       <pc:docMkLst>
         <pc:docMk/>
       </pc:docMkLst>
@@ -1133,13 +1133,13 @@
         </pc:spChg>
       </pc:sldChg>
       <pc:sldChg chg="modSp add mod">
-        <pc:chgData name="Matthieu De Mari" userId="dfb708c9-d8dc-439f-9a3b-c772bf4a311c" providerId="ADAL" clId="{5AF9E225-0E3D-4808-B523-40F6E9A1D59D}" dt="2023-03-02T07:41:39.244" v="2020" actId="27636"/>
+        <pc:chgData name="Matthieu De Mari" userId="dfb708c9-d8dc-439f-9a3b-c772bf4a311c" providerId="ADAL" clId="{5AF9E225-0E3D-4808-B523-40F6E9A1D59D}" dt="2023-03-20T08:28:30.862" v="4980" actId="113"/>
         <pc:sldMkLst>
           <pc:docMk/>
           <pc:sldMk cId="3941141626" sldId="279"/>
         </pc:sldMkLst>
         <pc:spChg chg="mod">
-          <ac:chgData name="Matthieu De Mari" userId="dfb708c9-d8dc-439f-9a3b-c772bf4a311c" providerId="ADAL" clId="{5AF9E225-0E3D-4808-B523-40F6E9A1D59D}" dt="2023-03-02T07:41:39.244" v="2020" actId="27636"/>
+          <ac:chgData name="Matthieu De Mari" userId="dfb708c9-d8dc-439f-9a3b-c772bf4a311c" providerId="ADAL" clId="{5AF9E225-0E3D-4808-B523-40F6E9A1D59D}" dt="2023-03-20T08:28:30.862" v="4980" actId="113"/>
           <ac:spMkLst>
             <pc:docMk/>
             <pc:sldMk cId="3941141626" sldId="279"/>
@@ -2271,7 +2271,7 @@
           <a:p>
             <a:fld id="{98CFC6A4-B085-437B-8084-693BEB2A32DE}" type="datetimeFigureOut">
               <a:rPr lang="en-SG" smtClean="0"/>
-              <a:t>14/3/2023</a:t>
+              <a:t>20/3/2023</a:t>
             </a:fld>
             <a:endParaRPr lang="en-SG"/>
           </a:p>
@@ -2772,7 +2772,7 @@
           <a:p>
             <a:fld id="{AB35F6B0-D468-4997-9CE3-CF2A1AE5E3F9}" type="datetimeFigureOut">
               <a:rPr lang="en-SG" smtClean="0"/>
-              <a:t>14/3/2023</a:t>
+              <a:t>20/3/2023</a:t>
             </a:fld>
             <a:endParaRPr lang="en-SG"/>
           </a:p>
@@ -2972,7 +2972,7 @@
           <a:p>
             <a:fld id="{AB35F6B0-D468-4997-9CE3-CF2A1AE5E3F9}" type="datetimeFigureOut">
               <a:rPr lang="en-SG" smtClean="0"/>
-              <a:t>14/3/2023</a:t>
+              <a:t>20/3/2023</a:t>
             </a:fld>
             <a:endParaRPr lang="en-SG"/>
           </a:p>
@@ -3182,7 +3182,7 @@
           <a:p>
             <a:fld id="{AB35F6B0-D468-4997-9CE3-CF2A1AE5E3F9}" type="datetimeFigureOut">
               <a:rPr lang="en-SG" smtClean="0"/>
-              <a:t>14/3/2023</a:t>
+              <a:t>20/3/2023</a:t>
             </a:fld>
             <a:endParaRPr lang="en-SG"/>
           </a:p>
@@ -3382,7 +3382,7 @@
           <a:p>
             <a:fld id="{AB35F6B0-D468-4997-9CE3-CF2A1AE5E3F9}" type="datetimeFigureOut">
               <a:rPr lang="en-SG" smtClean="0"/>
-              <a:t>14/3/2023</a:t>
+              <a:t>20/3/2023</a:t>
             </a:fld>
             <a:endParaRPr lang="en-SG"/>
           </a:p>
@@ -3658,7 +3658,7 @@
           <a:p>
             <a:fld id="{AB35F6B0-D468-4997-9CE3-CF2A1AE5E3F9}" type="datetimeFigureOut">
               <a:rPr lang="en-SG" smtClean="0"/>
-              <a:t>14/3/2023</a:t>
+              <a:t>20/3/2023</a:t>
             </a:fld>
             <a:endParaRPr lang="en-SG"/>
           </a:p>
@@ -3926,7 +3926,7 @@
           <a:p>
             <a:fld id="{AB35F6B0-D468-4997-9CE3-CF2A1AE5E3F9}" type="datetimeFigureOut">
               <a:rPr lang="en-SG" smtClean="0"/>
-              <a:t>14/3/2023</a:t>
+              <a:t>20/3/2023</a:t>
             </a:fld>
             <a:endParaRPr lang="en-SG"/>
           </a:p>
@@ -4341,7 +4341,7 @@
           <a:p>
             <a:fld id="{AB35F6B0-D468-4997-9CE3-CF2A1AE5E3F9}" type="datetimeFigureOut">
               <a:rPr lang="en-SG" smtClean="0"/>
-              <a:t>14/3/2023</a:t>
+              <a:t>20/3/2023</a:t>
             </a:fld>
             <a:endParaRPr lang="en-SG"/>
           </a:p>
@@ -4483,7 +4483,7 @@
           <a:p>
             <a:fld id="{AB35F6B0-D468-4997-9CE3-CF2A1AE5E3F9}" type="datetimeFigureOut">
               <a:rPr lang="en-SG" smtClean="0"/>
-              <a:t>14/3/2023</a:t>
+              <a:t>20/3/2023</a:t>
             </a:fld>
             <a:endParaRPr lang="en-SG"/>
           </a:p>
@@ -4596,7 +4596,7 @@
           <a:p>
             <a:fld id="{AB35F6B0-D468-4997-9CE3-CF2A1AE5E3F9}" type="datetimeFigureOut">
               <a:rPr lang="en-SG" smtClean="0"/>
-              <a:t>14/3/2023</a:t>
+              <a:t>20/3/2023</a:t>
             </a:fld>
             <a:endParaRPr lang="en-SG"/>
           </a:p>
@@ -4909,7 +4909,7 @@
           <a:p>
             <a:fld id="{AB35F6B0-D468-4997-9CE3-CF2A1AE5E3F9}" type="datetimeFigureOut">
               <a:rPr lang="en-SG" smtClean="0"/>
-              <a:t>14/3/2023</a:t>
+              <a:t>20/3/2023</a:t>
             </a:fld>
             <a:endParaRPr lang="en-SG"/>
           </a:p>
@@ -5198,7 +5198,7 @@
           <a:p>
             <a:fld id="{AB35F6B0-D468-4997-9CE3-CF2A1AE5E3F9}" type="datetimeFigureOut">
               <a:rPr lang="en-SG" smtClean="0"/>
-              <a:t>14/3/2023</a:t>
+              <a:t>20/3/2023</a:t>
             </a:fld>
             <a:endParaRPr lang="en-SG"/>
           </a:p>
@@ -5441,7 +5441,7 @@
           <a:p>
             <a:fld id="{AB35F6B0-D468-4997-9CE3-CF2A1AE5E3F9}" type="datetimeFigureOut">
               <a:rPr lang="en-SG" smtClean="0"/>
-              <a:t>14/3/2023</a:t>
+              <a:t>20/3/2023</a:t>
             </a:fld>
             <a:endParaRPr lang="en-SG"/>
           </a:p>
@@ -11711,7 +11711,31 @@
             </a:r>
             <a:r>
               <a:rPr lang="en-GB" dirty="0"/>
-              <a:t>An identifier is a name given to a variable, function, or other entity in a program. Will follow rules, such as starting with a letter or underscore and consisting of letters, digits, and underscores.</a:t>
+              <a:t>An identifier is a </a:t>
+            </a:r>
+            <a:r>
+              <a:rPr lang="en-GB" b="1" dirty="0"/>
+              <a:t>name given to a variable</a:t>
+            </a:r>
+            <a:r>
+              <a:rPr lang="en-GB" dirty="0"/>
+              <a:t>, </a:t>
+            </a:r>
+            <a:r>
+              <a:rPr lang="en-GB" b="1" dirty="0"/>
+              <a:t>function</a:t>
+            </a:r>
+            <a:r>
+              <a:rPr lang="en-GB" dirty="0"/>
+              <a:t>, or </a:t>
+            </a:r>
+            <a:r>
+              <a:rPr lang="en-GB" b="1" dirty="0"/>
+              <a:t>other entity </a:t>
+            </a:r>
+            <a:r>
+              <a:rPr lang="en-GB" dirty="0"/>
+              <a:t>in a program. Will follow rules, such as starting with a letter or underscore and consisting of letters, digits, and underscores.</a:t>
             </a:r>
           </a:p>
           <a:p>

</xml_diff>

<commit_message>
Finished the W9S3 materials.
</commit_message>
<xml_diff>
--- a/W8/W8S1/W8S1.pptx
+++ b/W8/W8S1/W8S1.pptx
@@ -303,7 +303,7 @@
   <pc:docChgLst>
     <pc:chgData name="Matthieu De Mari" userId="dfb708c9-d8dc-439f-9a3b-c772bf4a311c" providerId="ADAL" clId="{5AF9E225-0E3D-4808-B523-40F6E9A1D59D}"/>
     <pc:docChg chg="undo custSel mod addSld delSld modSld sldOrd modMainMaster addSection modSection">
-      <pc:chgData name="Matthieu De Mari" userId="dfb708c9-d8dc-439f-9a3b-c772bf4a311c" providerId="ADAL" clId="{5AF9E225-0E3D-4808-B523-40F6E9A1D59D}" dt="2023-03-20T08:28:30.862" v="4980" actId="113"/>
+      <pc:chgData name="Matthieu De Mari" userId="dfb708c9-d8dc-439f-9a3b-c772bf4a311c" providerId="ADAL" clId="{5AF9E225-0E3D-4808-B523-40F6E9A1D59D}" dt="2023-03-21T05:31:50.718" v="4982" actId="20577"/>
       <pc:docMkLst>
         <pc:docMk/>
       </pc:docMkLst>
@@ -2126,13 +2126,13 @@
         </pc:sldMkLst>
       </pc:sldChg>
       <pc:sldChg chg="modSp add mod">
-        <pc:chgData name="Matthieu De Mari" userId="dfb708c9-d8dc-439f-9a3b-c772bf4a311c" providerId="ADAL" clId="{5AF9E225-0E3D-4808-B523-40F6E9A1D59D}" dt="2023-03-14T09:03:50.345" v="4903" actId="20577"/>
+        <pc:chgData name="Matthieu De Mari" userId="dfb708c9-d8dc-439f-9a3b-c772bf4a311c" providerId="ADAL" clId="{5AF9E225-0E3D-4808-B523-40F6E9A1D59D}" dt="2023-03-21T05:31:50.718" v="4982" actId="20577"/>
         <pc:sldMkLst>
           <pc:docMk/>
           <pc:sldMk cId="3856210223" sldId="379"/>
         </pc:sldMkLst>
         <pc:spChg chg="mod">
-          <ac:chgData name="Matthieu De Mari" userId="dfb708c9-d8dc-439f-9a3b-c772bf4a311c" providerId="ADAL" clId="{5AF9E225-0E3D-4808-B523-40F6E9A1D59D}" dt="2023-03-14T09:03:50.345" v="4903" actId="20577"/>
+          <ac:chgData name="Matthieu De Mari" userId="dfb708c9-d8dc-439f-9a3b-c772bf4a311c" providerId="ADAL" clId="{5AF9E225-0E3D-4808-B523-40F6E9A1D59D}" dt="2023-03-21T05:31:50.718" v="4982" actId="20577"/>
           <ac:spMkLst>
             <pc:docMk/>
             <pc:sldMk cId="3856210223" sldId="379"/>
@@ -2271,7 +2271,7 @@
           <a:p>
             <a:fld id="{98CFC6A4-B085-437B-8084-693BEB2A32DE}" type="datetimeFigureOut">
               <a:rPr lang="en-SG" smtClean="0"/>
-              <a:t>20/3/2023</a:t>
+              <a:t>21/3/2023</a:t>
             </a:fld>
             <a:endParaRPr lang="en-SG"/>
           </a:p>
@@ -2772,7 +2772,7 @@
           <a:p>
             <a:fld id="{AB35F6B0-D468-4997-9CE3-CF2A1AE5E3F9}" type="datetimeFigureOut">
               <a:rPr lang="en-SG" smtClean="0"/>
-              <a:t>20/3/2023</a:t>
+              <a:t>21/3/2023</a:t>
             </a:fld>
             <a:endParaRPr lang="en-SG"/>
           </a:p>
@@ -2972,7 +2972,7 @@
           <a:p>
             <a:fld id="{AB35F6B0-D468-4997-9CE3-CF2A1AE5E3F9}" type="datetimeFigureOut">
               <a:rPr lang="en-SG" smtClean="0"/>
-              <a:t>20/3/2023</a:t>
+              <a:t>21/3/2023</a:t>
             </a:fld>
             <a:endParaRPr lang="en-SG"/>
           </a:p>
@@ -3182,7 +3182,7 @@
           <a:p>
             <a:fld id="{AB35F6B0-D468-4997-9CE3-CF2A1AE5E3F9}" type="datetimeFigureOut">
               <a:rPr lang="en-SG" smtClean="0"/>
-              <a:t>20/3/2023</a:t>
+              <a:t>21/3/2023</a:t>
             </a:fld>
             <a:endParaRPr lang="en-SG"/>
           </a:p>
@@ -3382,7 +3382,7 @@
           <a:p>
             <a:fld id="{AB35F6B0-D468-4997-9CE3-CF2A1AE5E3F9}" type="datetimeFigureOut">
               <a:rPr lang="en-SG" smtClean="0"/>
-              <a:t>20/3/2023</a:t>
+              <a:t>21/3/2023</a:t>
             </a:fld>
             <a:endParaRPr lang="en-SG"/>
           </a:p>
@@ -3658,7 +3658,7 @@
           <a:p>
             <a:fld id="{AB35F6B0-D468-4997-9CE3-CF2A1AE5E3F9}" type="datetimeFigureOut">
               <a:rPr lang="en-SG" smtClean="0"/>
-              <a:t>20/3/2023</a:t>
+              <a:t>21/3/2023</a:t>
             </a:fld>
             <a:endParaRPr lang="en-SG"/>
           </a:p>
@@ -3926,7 +3926,7 @@
           <a:p>
             <a:fld id="{AB35F6B0-D468-4997-9CE3-CF2A1AE5E3F9}" type="datetimeFigureOut">
               <a:rPr lang="en-SG" smtClean="0"/>
-              <a:t>20/3/2023</a:t>
+              <a:t>21/3/2023</a:t>
             </a:fld>
             <a:endParaRPr lang="en-SG"/>
           </a:p>
@@ -4341,7 +4341,7 @@
           <a:p>
             <a:fld id="{AB35F6B0-D468-4997-9CE3-CF2A1AE5E3F9}" type="datetimeFigureOut">
               <a:rPr lang="en-SG" smtClean="0"/>
-              <a:t>20/3/2023</a:t>
+              <a:t>21/3/2023</a:t>
             </a:fld>
             <a:endParaRPr lang="en-SG"/>
           </a:p>
@@ -4483,7 +4483,7 @@
           <a:p>
             <a:fld id="{AB35F6B0-D468-4997-9CE3-CF2A1AE5E3F9}" type="datetimeFigureOut">
               <a:rPr lang="en-SG" smtClean="0"/>
-              <a:t>20/3/2023</a:t>
+              <a:t>21/3/2023</a:t>
             </a:fld>
             <a:endParaRPr lang="en-SG"/>
           </a:p>
@@ -4596,7 +4596,7 @@
           <a:p>
             <a:fld id="{AB35F6B0-D468-4997-9CE3-CF2A1AE5E3F9}" type="datetimeFigureOut">
               <a:rPr lang="en-SG" smtClean="0"/>
-              <a:t>20/3/2023</a:t>
+              <a:t>21/3/2023</a:t>
             </a:fld>
             <a:endParaRPr lang="en-SG"/>
           </a:p>
@@ -4909,7 +4909,7 @@
           <a:p>
             <a:fld id="{AB35F6B0-D468-4997-9CE3-CF2A1AE5E3F9}" type="datetimeFigureOut">
               <a:rPr lang="en-SG" smtClean="0"/>
-              <a:t>20/3/2023</a:t>
+              <a:t>21/3/2023</a:t>
             </a:fld>
             <a:endParaRPr lang="en-SG"/>
           </a:p>
@@ -5198,7 +5198,7 @@
           <a:p>
             <a:fld id="{AB35F6B0-D468-4997-9CE3-CF2A1AE5E3F9}" type="datetimeFigureOut">
               <a:rPr lang="en-SG" smtClean="0"/>
-              <a:t>20/3/2023</a:t>
+              <a:t>21/3/2023</a:t>
             </a:fld>
             <a:endParaRPr lang="en-SG"/>
           </a:p>
@@ -5441,7 +5441,7 @@
           <a:p>
             <a:fld id="{AB35F6B0-D468-4997-9CE3-CF2A1AE5E3F9}" type="datetimeFigureOut">
               <a:rPr lang="en-SG" smtClean="0"/>
-              <a:t>20/3/2023</a:t>
+              <a:t>21/3/2023</a:t>
             </a:fld>
             <a:endParaRPr lang="en-SG"/>
           </a:p>
@@ -11977,12 +11977,8 @@
           <a:lstStyle/>
           <a:p>
             <a:r>
-              <a:rPr lang="en-GB" b="1" dirty="0" err="1"/>
-              <a:t>Litteral</a:t>
-            </a:r>
-            <a:r>
-              <a:rPr lang="en-GB" b="1" dirty="0"/>
-              <a:t>: </a:t>
+              <a:rPr lang="en-GB" b="1" dirty="0"/>
+              <a:t>Literal: </a:t>
             </a:r>
             <a:r>
               <a:rPr lang="en-GB" dirty="0"/>
@@ -12011,15 +12007,15 @@
             </a:pPr>
             <a:r>
               <a:rPr lang="en-GB" dirty="0"/>
-              <a:t>Examples of </a:t>
-            </a:r>
-            <a:r>
-              <a:rPr lang="en-GB" dirty="0" err="1"/>
-              <a:t>litterals</a:t>
-            </a:r>
-            <a:r>
-              <a:rPr lang="en-GB" dirty="0"/>
-              <a:t> in the C programming language: </a:t>
+              <a:t>Examples </a:t>
+            </a:r>
+            <a:r>
+              <a:rPr lang="en-GB"/>
+              <a:t>of literals </a:t>
+            </a:r>
+            <a:r>
+              <a:rPr lang="en-GB" dirty="0"/>
+              <a:t>in the C programming language: </a:t>
             </a:r>
           </a:p>
           <a:p>

</xml_diff>